<commit_message>
basic synth eval code working
</commit_message>
<xml_diff>
--- a/Results.pptx
+++ b/Results.pptx
@@ -7,8 +7,8 @@
   <p:sldIdLst>
     <p:sldId id="275" r:id="rId2"/>
     <p:sldId id="256" r:id="rId3"/>
-    <p:sldId id="257" r:id="rId4"/>
-    <p:sldId id="258" r:id="rId5"/>
+    <p:sldId id="258" r:id="rId4"/>
+    <p:sldId id="257" r:id="rId5"/>
     <p:sldId id="259" r:id="rId6"/>
     <p:sldId id="260" r:id="rId7"/>
     <p:sldId id="261" r:id="rId8"/>
@@ -273,7 +273,7 @@
           <a:p>
             <a:fld id="{8C4928E7-25E9-4A35-8DE4-756C3B164F1F}" type="datetimeFigureOut">
               <a:rPr lang="en-US" smtClean="0"/>
-              <a:t>7/3/2023</a:t>
+              <a:t>7/6/2023</a:t>
             </a:fld>
             <a:endParaRPr lang="en-US"/>
           </a:p>
@@ -443,7 +443,7 @@
           <a:p>
             <a:fld id="{8C4928E7-25E9-4A35-8DE4-756C3B164F1F}" type="datetimeFigureOut">
               <a:rPr lang="en-US" smtClean="0"/>
-              <a:t>7/3/2023</a:t>
+              <a:t>7/6/2023</a:t>
             </a:fld>
             <a:endParaRPr lang="en-US"/>
           </a:p>
@@ -623,7 +623,7 @@
           <a:p>
             <a:fld id="{8C4928E7-25E9-4A35-8DE4-756C3B164F1F}" type="datetimeFigureOut">
               <a:rPr lang="en-US" smtClean="0"/>
-              <a:t>7/3/2023</a:t>
+              <a:t>7/6/2023</a:t>
             </a:fld>
             <a:endParaRPr lang="en-US"/>
           </a:p>
@@ -793,7 +793,7 @@
           <a:p>
             <a:fld id="{8C4928E7-25E9-4A35-8DE4-756C3B164F1F}" type="datetimeFigureOut">
               <a:rPr lang="en-US" smtClean="0"/>
-              <a:t>7/3/2023</a:t>
+              <a:t>7/6/2023</a:t>
             </a:fld>
             <a:endParaRPr lang="en-US"/>
           </a:p>
@@ -1039,7 +1039,7 @@
           <a:p>
             <a:fld id="{8C4928E7-25E9-4A35-8DE4-756C3B164F1F}" type="datetimeFigureOut">
               <a:rPr lang="en-US" smtClean="0"/>
-              <a:t>7/3/2023</a:t>
+              <a:t>7/6/2023</a:t>
             </a:fld>
             <a:endParaRPr lang="en-US"/>
           </a:p>
@@ -1271,7 +1271,7 @@
           <a:p>
             <a:fld id="{8C4928E7-25E9-4A35-8DE4-756C3B164F1F}" type="datetimeFigureOut">
               <a:rPr lang="en-US" smtClean="0"/>
-              <a:t>7/3/2023</a:t>
+              <a:t>7/6/2023</a:t>
             </a:fld>
             <a:endParaRPr lang="en-US"/>
           </a:p>
@@ -1638,7 +1638,7 @@
           <a:p>
             <a:fld id="{8C4928E7-25E9-4A35-8DE4-756C3B164F1F}" type="datetimeFigureOut">
               <a:rPr lang="en-US" smtClean="0"/>
-              <a:t>7/3/2023</a:t>
+              <a:t>7/6/2023</a:t>
             </a:fld>
             <a:endParaRPr lang="en-US"/>
           </a:p>
@@ -1756,7 +1756,7 @@
           <a:p>
             <a:fld id="{8C4928E7-25E9-4A35-8DE4-756C3B164F1F}" type="datetimeFigureOut">
               <a:rPr lang="en-US" smtClean="0"/>
-              <a:t>7/3/2023</a:t>
+              <a:t>7/6/2023</a:t>
             </a:fld>
             <a:endParaRPr lang="en-US"/>
           </a:p>
@@ -1851,7 +1851,7 @@
           <a:p>
             <a:fld id="{8C4928E7-25E9-4A35-8DE4-756C3B164F1F}" type="datetimeFigureOut">
               <a:rPr lang="en-US" smtClean="0"/>
-              <a:t>7/3/2023</a:t>
+              <a:t>7/6/2023</a:t>
             </a:fld>
             <a:endParaRPr lang="en-US"/>
           </a:p>
@@ -2128,7 +2128,7 @@
           <a:p>
             <a:fld id="{8C4928E7-25E9-4A35-8DE4-756C3B164F1F}" type="datetimeFigureOut">
               <a:rPr lang="en-US" smtClean="0"/>
-              <a:t>7/3/2023</a:t>
+              <a:t>7/6/2023</a:t>
             </a:fld>
             <a:endParaRPr lang="en-US"/>
           </a:p>
@@ -2381,7 +2381,7 @@
           <a:p>
             <a:fld id="{8C4928E7-25E9-4A35-8DE4-756C3B164F1F}" type="datetimeFigureOut">
               <a:rPr lang="en-US" smtClean="0"/>
-              <a:t>7/3/2023</a:t>
+              <a:t>7/6/2023</a:t>
             </a:fld>
             <a:endParaRPr lang="en-US"/>
           </a:p>
@@ -2594,7 +2594,7 @@
           <a:p>
             <a:fld id="{8C4928E7-25E9-4A35-8DE4-756C3B164F1F}" type="datetimeFigureOut">
               <a:rPr lang="en-US" smtClean="0"/>
-              <a:t>7/3/2023</a:t>
+              <a:t>7/6/2023</a:t>
             </a:fld>
             <a:endParaRPr lang="en-US"/>
           </a:p>
@@ -4883,7 +4883,7 @@
         </p:blipFill>
         <p:spPr>
           <a:xfrm>
-            <a:off x="3145851" y="1583351"/>
+            <a:off x="3169914" y="1234435"/>
             <a:ext cx="5852172" cy="4389129"/>
           </a:xfrm>
           <a:prstGeom prst="rect">
@@ -4891,10 +4891,108 @@
           </a:prstGeom>
         </p:spPr>
       </p:pic>
+      <p:sp>
+        <p:nvSpPr>
+          <p:cNvPr id="4" name="Abgerundetes Rechteck 3"/>
+          <p:cNvSpPr/>
+          <p:nvPr/>
+        </p:nvSpPr>
+        <p:spPr>
+          <a:xfrm>
+            <a:off x="278360" y="3855452"/>
+            <a:ext cx="2822222" cy="1557867"/>
+          </a:xfrm>
+          <a:prstGeom prst="roundRect">
+            <a:avLst/>
+          </a:prstGeom>
+        </p:spPr>
+        <p:style>
+          <a:lnRef idx="2">
+            <a:schemeClr val="accent1">
+              <a:shade val="50000"/>
+            </a:schemeClr>
+          </a:lnRef>
+          <a:fillRef idx="1">
+            <a:schemeClr val="accent1"/>
+          </a:fillRef>
+          <a:effectRef idx="0">
+            <a:schemeClr val="accent1"/>
+          </a:effectRef>
+          <a:fontRef idx="minor">
+            <a:schemeClr val="lt1"/>
+          </a:fontRef>
+        </p:style>
+        <p:txBody>
+          <a:bodyPr rtlCol="0" anchor="ctr"/>
+          <a:lstStyle/>
+          <a:p>
+            <a:pPr algn="ctr"/>
+            <a:r>
+              <a:rPr lang="en-US" sz="1400" dirty="0" smtClean="0"/>
+              <a:t>This plot basically shows how well the different strategies use the available modeling budget</a:t>
+            </a:r>
+            <a:endParaRPr lang="en-US" sz="1400" dirty="0"/>
+          </a:p>
+        </p:txBody>
+      </p:sp>
+      <p:sp>
+        <p:nvSpPr>
+          <p:cNvPr id="7" name="Abgerundetes Rechteck 6"/>
+          <p:cNvSpPr/>
+          <p:nvPr/>
+        </p:nvSpPr>
+        <p:spPr>
+          <a:xfrm>
+            <a:off x="9091418" y="4376821"/>
+            <a:ext cx="2822222" cy="1557867"/>
+          </a:xfrm>
+          <a:prstGeom prst="roundRect">
+            <a:avLst/>
+          </a:prstGeom>
+          <a:solidFill>
+            <a:srgbClr val="FF0000"/>
+          </a:solidFill>
+        </p:spPr>
+        <p:style>
+          <a:lnRef idx="2">
+            <a:schemeClr val="accent1">
+              <a:shade val="50000"/>
+            </a:schemeClr>
+          </a:lnRef>
+          <a:fillRef idx="1">
+            <a:schemeClr val="accent1"/>
+          </a:fillRef>
+          <a:effectRef idx="0">
+            <a:schemeClr val="accent1"/>
+          </a:effectRef>
+          <a:fontRef idx="minor">
+            <a:schemeClr val="lt1"/>
+          </a:fontRef>
+        </p:style>
+        <p:txBody>
+          <a:bodyPr rtlCol="0" anchor="ctr"/>
+          <a:lstStyle/>
+          <a:p>
+            <a:pPr algn="ctr"/>
+            <a:r>
+              <a:rPr lang="en-US" sz="1400" dirty="0" smtClean="0"/>
+              <a:t>???</a:t>
+            </a:r>
+          </a:p>
+          <a:p>
+            <a:pPr algn="ctr"/>
+            <a:r>
+              <a:rPr lang="en-US" sz="1400" dirty="0" smtClean="0"/>
+              <a:t>Maybe I should change this plot to show the difference better…</a:t>
+            </a:r>
+            <a:endParaRPr lang="en-US" sz="1400" dirty="0"/>
+          </a:p>
+        </p:txBody>
+      </p:sp>
     </p:spTree>
     <p:extLst>
       <p:ext uri="{BB962C8B-B14F-4D97-AF65-F5344CB8AC3E}">
-        <p14:creationId xmlns:p14="http://schemas.microsoft.com/office/powerpoint/2010/main" val="1686849208"/>
+        <p14:creationId xmlns:p14="http://schemas.microsoft.com/office/powerpoint/2010/main" val="3196979004"/>
       </p:ext>
     </p:extLst>
   </p:cSld>
@@ -4973,7 +5071,7 @@
         </p:blipFill>
         <p:spPr>
           <a:xfrm>
-            <a:off x="3169914" y="1234435"/>
+            <a:off x="3145851" y="1583351"/>
             <a:ext cx="5852172" cy="4389129"/>
           </a:xfrm>
           <a:prstGeom prst="rect">
@@ -4981,10 +5079,89 @@
           </a:prstGeom>
         </p:spPr>
       </p:pic>
+      <p:sp>
+        <p:nvSpPr>
+          <p:cNvPr id="4" name="Abgerundetes Rechteck 3"/>
+          <p:cNvSpPr/>
+          <p:nvPr/>
+        </p:nvSpPr>
+        <p:spPr>
+          <a:xfrm>
+            <a:off x="310444" y="3911600"/>
+            <a:ext cx="2822222" cy="1557867"/>
+          </a:xfrm>
+          <a:prstGeom prst="roundRect">
+            <a:avLst/>
+          </a:prstGeom>
+        </p:spPr>
+        <p:style>
+          <a:lnRef idx="2">
+            <a:schemeClr val="accent1">
+              <a:shade val="50000"/>
+            </a:schemeClr>
+          </a:lnRef>
+          <a:fillRef idx="1">
+            <a:schemeClr val="accent1"/>
+          </a:fillRef>
+          <a:effectRef idx="0">
+            <a:schemeClr val="accent1"/>
+          </a:effectRef>
+          <a:fontRef idx="minor">
+            <a:schemeClr val="lt1"/>
+          </a:fontRef>
+        </p:style>
+        <p:txBody>
+          <a:bodyPr rtlCol="0" anchor="ctr"/>
+          <a:lstStyle/>
+          <a:p>
+            <a:pPr algn="ctr"/>
+            <a:r>
+              <a:rPr lang="en-US" sz="1400" dirty="0" smtClean="0"/>
+              <a:t>We can get the same accuracy for our models but need to measure less configurations with the GPR strategy…</a:t>
+            </a:r>
+            <a:endParaRPr lang="en-US" sz="1400" dirty="0"/>
+          </a:p>
+        </p:txBody>
+      </p:sp>
+      <p:cxnSp>
+        <p:nvCxnSpPr>
+          <p:cNvPr id="5" name="Gerade Verbindung mit Pfeil 4"/>
+          <p:cNvCxnSpPr>
+            <a:stCxn id="4" idx="3"/>
+          </p:cNvCxnSpPr>
+          <p:nvPr/>
+        </p:nvCxnSpPr>
+        <p:spPr>
+          <a:xfrm>
+            <a:off x="3132666" y="4690534"/>
+            <a:ext cx="1319018" cy="41887"/>
+          </a:xfrm>
+          <a:prstGeom prst="straightConnector1">
+            <a:avLst/>
+          </a:prstGeom>
+          <a:ln w="76200">
+            <a:tailEnd type="triangle"/>
+          </a:ln>
+        </p:spPr>
+        <p:style>
+          <a:lnRef idx="1">
+            <a:schemeClr val="accent1"/>
+          </a:lnRef>
+          <a:fillRef idx="0">
+            <a:schemeClr val="accent1"/>
+          </a:fillRef>
+          <a:effectRef idx="0">
+            <a:schemeClr val="accent1"/>
+          </a:effectRef>
+          <a:fontRef idx="minor">
+            <a:schemeClr val="tx1"/>
+          </a:fontRef>
+        </p:style>
+      </p:cxnSp>
     </p:spTree>
     <p:extLst>
       <p:ext uri="{BB962C8B-B14F-4D97-AF65-F5344CB8AC3E}">
-        <p14:creationId xmlns:p14="http://schemas.microsoft.com/office/powerpoint/2010/main" val="3196979004"/>
+        <p14:creationId xmlns:p14="http://schemas.microsoft.com/office/powerpoint/2010/main" val="1686849208"/>
       </p:ext>
     </p:extLst>
   </p:cSld>

</xml_diff>

<commit_message>
fixed bug for 4 parameters
</commit_message>
<xml_diff>
--- a/Results.pptx
+++ b/Results.pptx
@@ -6,24 +6,27 @@
   </p:sldMasterIdLst>
   <p:sldIdLst>
     <p:sldId id="275" r:id="rId2"/>
-    <p:sldId id="256" r:id="rId3"/>
-    <p:sldId id="258" r:id="rId4"/>
-    <p:sldId id="257" r:id="rId5"/>
-    <p:sldId id="259" r:id="rId6"/>
-    <p:sldId id="260" r:id="rId7"/>
-    <p:sldId id="261" r:id="rId8"/>
-    <p:sldId id="262" r:id="rId9"/>
-    <p:sldId id="263" r:id="rId10"/>
-    <p:sldId id="264" r:id="rId11"/>
-    <p:sldId id="265" r:id="rId12"/>
-    <p:sldId id="266" r:id="rId13"/>
-    <p:sldId id="267" r:id="rId14"/>
-    <p:sldId id="268" r:id="rId15"/>
-    <p:sldId id="269" r:id="rId16"/>
-    <p:sldId id="270" r:id="rId17"/>
-    <p:sldId id="271" r:id="rId18"/>
-    <p:sldId id="272" r:id="rId19"/>
-    <p:sldId id="273" r:id="rId20"/>
+    <p:sldId id="276" r:id="rId3"/>
+    <p:sldId id="278" r:id="rId4"/>
+    <p:sldId id="277" r:id="rId5"/>
+    <p:sldId id="256" r:id="rId6"/>
+    <p:sldId id="258" r:id="rId7"/>
+    <p:sldId id="257" r:id="rId8"/>
+    <p:sldId id="259" r:id="rId9"/>
+    <p:sldId id="260" r:id="rId10"/>
+    <p:sldId id="261" r:id="rId11"/>
+    <p:sldId id="262" r:id="rId12"/>
+    <p:sldId id="263" r:id="rId13"/>
+    <p:sldId id="264" r:id="rId14"/>
+    <p:sldId id="265" r:id="rId15"/>
+    <p:sldId id="266" r:id="rId16"/>
+    <p:sldId id="267" r:id="rId17"/>
+    <p:sldId id="268" r:id="rId18"/>
+    <p:sldId id="269" r:id="rId19"/>
+    <p:sldId id="270" r:id="rId20"/>
+    <p:sldId id="271" r:id="rId21"/>
+    <p:sldId id="272" r:id="rId22"/>
+    <p:sldId id="273" r:id="rId23"/>
   </p:sldIdLst>
   <p:sldSz cx="12192000" cy="6858000"/>
   <p:notesSz cx="6858000" cy="9144000"/>
@@ -3024,45 +3027,6 @@
           </a:p>
         </p:txBody>
       </p:sp>
-      <p:sp>
-        <p:nvSpPr>
-          <p:cNvPr id="3" name="Untertitel 2"/>
-          <p:cNvSpPr>
-            <a:spLocks noGrp="1"/>
-          </p:cNvSpPr>
-          <p:nvPr>
-            <p:ph type="subTitle" idx="1"/>
-          </p:nvPr>
-        </p:nvSpPr>
-        <p:spPr/>
-        <p:txBody>
-          <a:bodyPr/>
-          <a:lstStyle/>
-          <a:p>
-            <a:r>
-              <a:rPr lang="en-US" dirty="0" smtClean="0"/>
-              <a:t>Case-Studies: Relearn, </a:t>
-            </a:r>
-            <a:r>
-              <a:rPr lang="en-US" dirty="0" err="1" smtClean="0"/>
-              <a:t>Lulesh</a:t>
-            </a:r>
-            <a:r>
-              <a:rPr lang="en-US" dirty="0" smtClean="0"/>
-              <a:t>, </a:t>
-            </a:r>
-            <a:r>
-              <a:rPr lang="en-US" dirty="0" err="1" smtClean="0"/>
-              <a:t>MiniFE</a:t>
-            </a:r>
-            <a:r>
-              <a:rPr lang="en-US" dirty="0" smtClean="0"/>
-              <a:t>, Kripke, FASTEST, Quicksilver</a:t>
-            </a:r>
-            <a:endParaRPr lang="en-US" dirty="0"/>
-          </a:p>
-        </p:txBody>
-      </p:sp>
     </p:spTree>
     <p:extLst>
       <p:ext uri="{BB962C8B-B14F-4D97-AF65-F5344CB8AC3E}">
@@ -3101,8 +3065,8 @@
         </p:nvSpPr>
         <p:spPr>
           <a:xfrm>
-            <a:off x="1128889" y="485422"/>
-            <a:ext cx="4323644" cy="461665"/>
+            <a:off x="1128888" y="485422"/>
+            <a:ext cx="6784827" cy="461665"/>
           </a:xfrm>
           <a:prstGeom prst="rect">
             <a:avLst/>
@@ -3116,21 +3080,137 @@
           <a:lstStyle/>
           <a:p>
             <a:r>
-              <a:rPr lang="en-US" sz="2400" b="1" dirty="0" err="1" smtClean="0"/>
-              <a:t>MiniFE</a:t>
-            </a:r>
-            <a:r>
               <a:rPr lang="en-US" sz="2400" b="1" dirty="0" smtClean="0"/>
-              <a:t> results</a:t>
+              <a:t>LULESH results – additional points</a:t>
             </a:r>
             <a:endParaRPr lang="en-US" sz="2400" b="1" dirty="0"/>
           </a:p>
         </p:txBody>
       </p:sp>
+      <p:pic>
+        <p:nvPicPr>
+          <p:cNvPr id="2" name="Grafik 1"/>
+          <p:cNvPicPr>
+            <a:picLocks noChangeAspect="1"/>
+          </p:cNvPicPr>
+          <p:nvPr/>
+        </p:nvPicPr>
+        <p:blipFill>
+          <a:blip r:embed="rId2">
+            <a:extLst>
+              <a:ext uri="{28A0092B-C50C-407E-A947-70E740481C1C}">
+                <a14:useLocalDpi xmlns:a14="http://schemas.microsoft.com/office/drawing/2010/main" val="0"/>
+              </a:ext>
+            </a:extLst>
+          </a:blip>
+          <a:stretch>
+            <a:fillRect/>
+          </a:stretch>
+        </p:blipFill>
+        <p:spPr>
+          <a:xfrm>
+            <a:off x="0" y="-477987"/>
+            <a:ext cx="5852172" cy="4389129"/>
+          </a:xfrm>
+          <a:prstGeom prst="rect">
+            <a:avLst/>
+          </a:prstGeom>
+        </p:spPr>
+      </p:pic>
+      <p:pic>
+        <p:nvPicPr>
+          <p:cNvPr id="3" name="Grafik 2"/>
+          <p:cNvPicPr>
+            <a:picLocks noChangeAspect="1"/>
+          </p:cNvPicPr>
+          <p:nvPr/>
+        </p:nvPicPr>
+        <p:blipFill>
+          <a:blip r:embed="rId2">
+            <a:extLst>
+              <a:ext uri="{28A0092B-C50C-407E-A947-70E740481C1C}">
+                <a14:useLocalDpi xmlns:a14="http://schemas.microsoft.com/office/drawing/2010/main" val="0"/>
+              </a:ext>
+            </a:extLst>
+          </a:blip>
+          <a:stretch>
+            <a:fillRect/>
+          </a:stretch>
+        </p:blipFill>
+        <p:spPr>
+          <a:xfrm>
+            <a:off x="5896507" y="-943499"/>
+            <a:ext cx="5852172" cy="4389129"/>
+          </a:xfrm>
+          <a:prstGeom prst="rect">
+            <a:avLst/>
+          </a:prstGeom>
+        </p:spPr>
+      </p:pic>
+      <p:pic>
+        <p:nvPicPr>
+          <p:cNvPr id="4" name="Grafik 3"/>
+          <p:cNvPicPr>
+            <a:picLocks noChangeAspect="1"/>
+          </p:cNvPicPr>
+          <p:nvPr/>
+        </p:nvPicPr>
+        <p:blipFill>
+          <a:blip r:embed="rId2">
+            <a:extLst>
+              <a:ext uri="{28A0092B-C50C-407E-A947-70E740481C1C}">
+                <a14:useLocalDpi xmlns:a14="http://schemas.microsoft.com/office/drawing/2010/main" val="0"/>
+              </a:ext>
+            </a:extLst>
+          </a:blip>
+          <a:stretch>
+            <a:fillRect/>
+          </a:stretch>
+        </p:blipFill>
+        <p:spPr>
+          <a:xfrm>
+            <a:off x="44335" y="3198605"/>
+            <a:ext cx="5852172" cy="4389129"/>
+          </a:xfrm>
+          <a:prstGeom prst="rect">
+            <a:avLst/>
+          </a:prstGeom>
+        </p:spPr>
+      </p:pic>
+      <p:pic>
+        <p:nvPicPr>
+          <p:cNvPr id="5" name="Grafik 4"/>
+          <p:cNvPicPr>
+            <a:picLocks noChangeAspect="1"/>
+          </p:cNvPicPr>
+          <p:nvPr/>
+        </p:nvPicPr>
+        <p:blipFill>
+          <a:blip r:embed="rId2">
+            <a:extLst>
+              <a:ext uri="{28A0092B-C50C-407E-A947-70E740481C1C}">
+                <a14:useLocalDpi xmlns:a14="http://schemas.microsoft.com/office/drawing/2010/main" val="0"/>
+              </a:ext>
+            </a:extLst>
+          </a:blip>
+          <a:stretch>
+            <a:fillRect/>
+          </a:stretch>
+        </p:blipFill>
+        <p:spPr>
+          <a:xfrm>
+            <a:off x="5447601" y="3198605"/>
+            <a:ext cx="5852172" cy="4389129"/>
+          </a:xfrm>
+          <a:prstGeom prst="rect">
+            <a:avLst/>
+          </a:prstGeom>
+        </p:spPr>
+      </p:pic>
     </p:spTree>
     <p:extLst>
       <p:ext uri="{BB962C8B-B14F-4D97-AF65-F5344CB8AC3E}">
-        <p14:creationId xmlns:p14="http://schemas.microsoft.com/office/powerpoint/2010/main" val="1225703755"/>
+        <p14:creationId xmlns:p14="http://schemas.microsoft.com/office/powerpoint/2010/main" val="813284526"/>
       </p:ext>
     </p:extLst>
   </p:cSld>
@@ -3180,8 +3260,12 @@
           <a:lstStyle/>
           <a:p>
             <a:r>
+              <a:rPr lang="en-US" sz="2400" b="1" dirty="0" err="1" smtClean="0"/>
+              <a:t>MiniFE</a:t>
+            </a:r>
+            <a:r>
               <a:rPr lang="en-US" sz="2400" b="1" dirty="0" smtClean="0"/>
-              <a:t>Kripke results</a:t>
+              <a:t> results</a:t>
             </a:r>
             <a:endParaRPr lang="en-US" sz="2400" b="1" dirty="0"/>
           </a:p>
@@ -3190,7 +3274,7 @@
     </p:spTree>
     <p:extLst>
       <p:ext uri="{BB962C8B-B14F-4D97-AF65-F5344CB8AC3E}">
-        <p14:creationId xmlns:p14="http://schemas.microsoft.com/office/powerpoint/2010/main" val="3659605943"/>
+        <p14:creationId xmlns:p14="http://schemas.microsoft.com/office/powerpoint/2010/main" val="3761832199"/>
       </p:ext>
     </p:extLst>
   </p:cSld>
@@ -3240,8 +3324,12 @@
           <a:lstStyle/>
           <a:p>
             <a:r>
+              <a:rPr lang="en-US" sz="2400" b="1" dirty="0" err="1" smtClean="0"/>
+              <a:t>MiniFE</a:t>
+            </a:r>
+            <a:r>
               <a:rPr lang="en-US" sz="2400" b="1" dirty="0" smtClean="0"/>
-              <a:t>Kripke results</a:t>
+              <a:t> results</a:t>
             </a:r>
             <a:endParaRPr lang="en-US" sz="2400" b="1" dirty="0"/>
           </a:p>
@@ -3250,7 +3338,7 @@
     </p:spTree>
     <p:extLst>
       <p:ext uri="{BB962C8B-B14F-4D97-AF65-F5344CB8AC3E}">
-        <p14:creationId xmlns:p14="http://schemas.microsoft.com/office/powerpoint/2010/main" val="2176036657"/>
+        <p14:creationId xmlns:p14="http://schemas.microsoft.com/office/powerpoint/2010/main" val="4115146552"/>
       </p:ext>
     </p:extLst>
   </p:cSld>
@@ -3300,8 +3388,12 @@
           <a:lstStyle/>
           <a:p>
             <a:r>
+              <a:rPr lang="en-US" sz="2400" b="1" dirty="0" err="1" smtClean="0"/>
+              <a:t>MiniFE</a:t>
+            </a:r>
+            <a:r>
               <a:rPr lang="en-US" sz="2400" b="1" dirty="0" smtClean="0"/>
-              <a:t>Kripke results</a:t>
+              <a:t> results</a:t>
             </a:r>
             <a:endParaRPr lang="en-US" sz="2400" b="1" dirty="0"/>
           </a:p>
@@ -3310,7 +3402,7 @@
     </p:spTree>
     <p:extLst>
       <p:ext uri="{BB962C8B-B14F-4D97-AF65-F5344CB8AC3E}">
-        <p14:creationId xmlns:p14="http://schemas.microsoft.com/office/powerpoint/2010/main" val="3830810872"/>
+        <p14:creationId xmlns:p14="http://schemas.microsoft.com/office/powerpoint/2010/main" val="1225703755"/>
       </p:ext>
     </p:extLst>
   </p:cSld>
@@ -3361,7 +3453,7 @@
           <a:p>
             <a:r>
               <a:rPr lang="en-US" sz="2400" b="1" dirty="0" smtClean="0"/>
-              <a:t>FASTEST results</a:t>
+              <a:t>Kripke results</a:t>
             </a:r>
             <a:endParaRPr lang="en-US" sz="2400" b="1" dirty="0"/>
           </a:p>
@@ -3370,7 +3462,7 @@
     </p:spTree>
     <p:extLst>
       <p:ext uri="{BB962C8B-B14F-4D97-AF65-F5344CB8AC3E}">
-        <p14:creationId xmlns:p14="http://schemas.microsoft.com/office/powerpoint/2010/main" val="754757463"/>
+        <p14:creationId xmlns:p14="http://schemas.microsoft.com/office/powerpoint/2010/main" val="3659605943"/>
       </p:ext>
     </p:extLst>
   </p:cSld>
@@ -3421,7 +3513,7 @@
           <a:p>
             <a:r>
               <a:rPr lang="en-US" sz="2400" b="1" dirty="0" smtClean="0"/>
-              <a:t>FASTEST results</a:t>
+              <a:t>Kripke results</a:t>
             </a:r>
             <a:endParaRPr lang="en-US" sz="2400" b="1" dirty="0"/>
           </a:p>
@@ -3430,7 +3522,7 @@
     </p:spTree>
     <p:extLst>
       <p:ext uri="{BB962C8B-B14F-4D97-AF65-F5344CB8AC3E}">
-        <p14:creationId xmlns:p14="http://schemas.microsoft.com/office/powerpoint/2010/main" val="1981088456"/>
+        <p14:creationId xmlns:p14="http://schemas.microsoft.com/office/powerpoint/2010/main" val="2176036657"/>
       </p:ext>
     </p:extLst>
   </p:cSld>
@@ -3481,7 +3573,7 @@
           <a:p>
             <a:r>
               <a:rPr lang="en-US" sz="2400" b="1" dirty="0" smtClean="0"/>
-              <a:t>FASTEST results</a:t>
+              <a:t>Kripke results</a:t>
             </a:r>
             <a:endParaRPr lang="en-US" sz="2400" b="1" dirty="0"/>
           </a:p>
@@ -3490,7 +3582,7 @@
     </p:spTree>
     <p:extLst>
       <p:ext uri="{BB962C8B-B14F-4D97-AF65-F5344CB8AC3E}">
-        <p14:creationId xmlns:p14="http://schemas.microsoft.com/office/powerpoint/2010/main" val="2744005304"/>
+        <p14:creationId xmlns:p14="http://schemas.microsoft.com/office/powerpoint/2010/main" val="3830810872"/>
       </p:ext>
     </p:extLst>
   </p:cSld>
@@ -3541,7 +3633,7 @@
           <a:p>
             <a:r>
               <a:rPr lang="en-US" sz="2400" b="1" dirty="0" smtClean="0"/>
-              <a:t>Quicksilver results</a:t>
+              <a:t>FASTEST results</a:t>
             </a:r>
             <a:endParaRPr lang="en-US" sz="2400" b="1" dirty="0"/>
           </a:p>
@@ -3550,7 +3642,7 @@
     </p:spTree>
     <p:extLst>
       <p:ext uri="{BB962C8B-B14F-4D97-AF65-F5344CB8AC3E}">
-        <p14:creationId xmlns:p14="http://schemas.microsoft.com/office/powerpoint/2010/main" val="760213402"/>
+        <p14:creationId xmlns:p14="http://schemas.microsoft.com/office/powerpoint/2010/main" val="754757463"/>
       </p:ext>
     </p:extLst>
   </p:cSld>
@@ -3601,7 +3693,7 @@
           <a:p>
             <a:r>
               <a:rPr lang="en-US" sz="2400" b="1" dirty="0" smtClean="0"/>
-              <a:t>Quicksilver results</a:t>
+              <a:t>FASTEST results</a:t>
             </a:r>
             <a:endParaRPr lang="en-US" sz="2400" b="1" dirty="0"/>
           </a:p>
@@ -3610,7 +3702,7 @@
     </p:spTree>
     <p:extLst>
       <p:ext uri="{BB962C8B-B14F-4D97-AF65-F5344CB8AC3E}">
-        <p14:creationId xmlns:p14="http://schemas.microsoft.com/office/powerpoint/2010/main" val="4067684214"/>
+        <p14:creationId xmlns:p14="http://schemas.microsoft.com/office/powerpoint/2010/main" val="1981088456"/>
       </p:ext>
     </p:extLst>
   </p:cSld>
@@ -3661,6 +3753,317 @@
           <a:p>
             <a:r>
               <a:rPr lang="en-US" sz="2400" b="1" dirty="0" smtClean="0"/>
+              <a:t>FASTEST results</a:t>
+            </a:r>
+            <a:endParaRPr lang="en-US" sz="2400" b="1" dirty="0"/>
+          </a:p>
+        </p:txBody>
+      </p:sp>
+    </p:spTree>
+    <p:extLst>
+      <p:ext uri="{BB962C8B-B14F-4D97-AF65-F5344CB8AC3E}">
+        <p14:creationId xmlns:p14="http://schemas.microsoft.com/office/powerpoint/2010/main" val="2744005304"/>
+      </p:ext>
+    </p:extLst>
+  </p:cSld>
+  <p:clrMapOvr>
+    <a:masterClrMapping/>
+  </p:clrMapOvr>
+</p:sld>
+</file>
+
+<file path=ppt/slides/slide2.xml><?xml version="1.0" encoding="utf-8"?>
+<p:sld xmlns:a="http://schemas.openxmlformats.org/drawingml/2006/main" xmlns:r="http://schemas.openxmlformats.org/officeDocument/2006/relationships" xmlns:p="http://schemas.openxmlformats.org/presentationml/2006/main">
+  <p:cSld>
+    <p:spTree>
+      <p:nvGrpSpPr>
+        <p:cNvPr id="1" name=""/>
+        <p:cNvGrpSpPr/>
+        <p:nvPr/>
+      </p:nvGrpSpPr>
+      <p:grpSpPr>
+        <a:xfrm>
+          <a:off x="0" y="0"/>
+          <a:ext cx="0" cy="0"/>
+          <a:chOff x="0" y="0"/>
+          <a:chExt cx="0" cy="0"/>
+        </a:xfrm>
+      </p:grpSpPr>
+      <p:sp>
+        <p:nvSpPr>
+          <p:cNvPr id="2" name="Titel 1"/>
+          <p:cNvSpPr>
+            <a:spLocks noGrp="1"/>
+          </p:cNvSpPr>
+          <p:nvPr>
+            <p:ph type="title"/>
+          </p:nvPr>
+        </p:nvSpPr>
+        <p:spPr/>
+        <p:txBody>
+          <a:bodyPr/>
+          <a:lstStyle/>
+          <a:p>
+            <a:r>
+              <a:rPr lang="en-US" dirty="0" smtClean="0"/>
+              <a:t>Questions</a:t>
+            </a:r>
+            <a:endParaRPr lang="en-US" dirty="0"/>
+          </a:p>
+        </p:txBody>
+      </p:sp>
+      <p:sp>
+        <p:nvSpPr>
+          <p:cNvPr id="3" name="Inhaltsplatzhalter 2"/>
+          <p:cNvSpPr>
+            <a:spLocks noGrp="1"/>
+          </p:cNvSpPr>
+          <p:nvPr>
+            <p:ph idx="1"/>
+          </p:nvPr>
+        </p:nvSpPr>
+        <p:spPr/>
+        <p:txBody>
+          <a:bodyPr/>
+          <a:lstStyle/>
+          <a:p>
+            <a:r>
+              <a:rPr lang="en-US" dirty="0" smtClean="0"/>
+              <a:t>Function generation</a:t>
+            </a:r>
+          </a:p>
+          <a:p>
+            <a:pPr lvl="1"/>
+            <a:r>
+              <a:rPr lang="en-US" dirty="0" smtClean="0"/>
+              <a:t>Which exponents and coefficients to use</a:t>
+            </a:r>
+          </a:p>
+          <a:p>
+            <a:pPr lvl="1"/>
+            <a:r>
+              <a:rPr lang="en-US" dirty="0" smtClean="0"/>
+              <a:t>Check term contribution or not? For 3+ parameters very time-consuming to find functions where all 3 terms &gt;1% contribution</a:t>
+            </a:r>
+          </a:p>
+          <a:p>
+            <a:pPr lvl="1"/>
+            <a:r>
+              <a:rPr lang="en-US" dirty="0" smtClean="0"/>
+              <a:t>Parameter values</a:t>
+            </a:r>
+          </a:p>
+          <a:p>
+            <a:pPr lvl="1"/>
+            <a:r>
+              <a:rPr lang="en-US" dirty="0" smtClean="0"/>
+              <a:t>Function types</a:t>
+            </a:r>
+          </a:p>
+          <a:p>
+            <a:r>
+              <a:rPr lang="en-US" dirty="0" smtClean="0"/>
+              <a:t>Modeler configuration</a:t>
+            </a:r>
+          </a:p>
+          <a:p>
+            <a:pPr lvl="2"/>
+            <a:r>
+              <a:rPr lang="en-US" dirty="0" smtClean="0"/>
+              <a:t>Number of terms per parameter</a:t>
+            </a:r>
+          </a:p>
+          <a:p>
+            <a:pPr lvl="2"/>
+            <a:r>
+              <a:rPr lang="en-US" dirty="0" smtClean="0"/>
+              <a:t>Exponents</a:t>
+            </a:r>
+          </a:p>
+          <a:p>
+            <a:pPr lvl="2"/>
+            <a:endParaRPr lang="en-US" dirty="0" smtClean="0"/>
+          </a:p>
+          <a:p>
+            <a:pPr lvl="1"/>
+            <a:endParaRPr lang="en-US" dirty="0"/>
+          </a:p>
+        </p:txBody>
+      </p:sp>
+    </p:spTree>
+    <p:extLst>
+      <p:ext uri="{BB962C8B-B14F-4D97-AF65-F5344CB8AC3E}">
+        <p14:creationId xmlns:p14="http://schemas.microsoft.com/office/powerpoint/2010/main" val="2667505098"/>
+      </p:ext>
+    </p:extLst>
+  </p:cSld>
+  <p:clrMapOvr>
+    <a:masterClrMapping/>
+  </p:clrMapOvr>
+</p:sld>
+</file>
+
+<file path=ppt/slides/slide20.xml><?xml version="1.0" encoding="utf-8"?>
+<p:sld xmlns:a="http://schemas.openxmlformats.org/drawingml/2006/main" xmlns:r="http://schemas.openxmlformats.org/officeDocument/2006/relationships" xmlns:p="http://schemas.openxmlformats.org/presentationml/2006/main">
+  <p:cSld>
+    <p:spTree>
+      <p:nvGrpSpPr>
+        <p:cNvPr id="1" name=""/>
+        <p:cNvGrpSpPr/>
+        <p:nvPr/>
+      </p:nvGrpSpPr>
+      <p:grpSpPr>
+        <a:xfrm>
+          <a:off x="0" y="0"/>
+          <a:ext cx="0" cy="0"/>
+          <a:chOff x="0" y="0"/>
+          <a:chExt cx="0" cy="0"/>
+        </a:xfrm>
+      </p:grpSpPr>
+      <p:sp>
+        <p:nvSpPr>
+          <p:cNvPr id="14" name="Textfeld 13"/>
+          <p:cNvSpPr txBox="1"/>
+          <p:nvPr/>
+        </p:nvSpPr>
+        <p:spPr>
+          <a:xfrm>
+            <a:off x="1128889" y="485422"/>
+            <a:ext cx="4323644" cy="461665"/>
+          </a:xfrm>
+          <a:prstGeom prst="rect">
+            <a:avLst/>
+          </a:prstGeom>
+          <a:noFill/>
+        </p:spPr>
+        <p:txBody>
+          <a:bodyPr wrap="square" rtlCol="0">
+            <a:spAutoFit/>
+          </a:bodyPr>
+          <a:lstStyle/>
+          <a:p>
+            <a:r>
+              <a:rPr lang="en-US" sz="2400" b="1" dirty="0" smtClean="0"/>
+              <a:t>Quicksilver results</a:t>
+            </a:r>
+            <a:endParaRPr lang="en-US" sz="2400" b="1" dirty="0"/>
+          </a:p>
+        </p:txBody>
+      </p:sp>
+    </p:spTree>
+    <p:extLst>
+      <p:ext uri="{BB962C8B-B14F-4D97-AF65-F5344CB8AC3E}">
+        <p14:creationId xmlns:p14="http://schemas.microsoft.com/office/powerpoint/2010/main" val="760213402"/>
+      </p:ext>
+    </p:extLst>
+  </p:cSld>
+  <p:clrMapOvr>
+    <a:masterClrMapping/>
+  </p:clrMapOvr>
+</p:sld>
+</file>
+
+<file path=ppt/slides/slide21.xml><?xml version="1.0" encoding="utf-8"?>
+<p:sld xmlns:a="http://schemas.openxmlformats.org/drawingml/2006/main" xmlns:r="http://schemas.openxmlformats.org/officeDocument/2006/relationships" xmlns:p="http://schemas.openxmlformats.org/presentationml/2006/main">
+  <p:cSld>
+    <p:spTree>
+      <p:nvGrpSpPr>
+        <p:cNvPr id="1" name=""/>
+        <p:cNvGrpSpPr/>
+        <p:nvPr/>
+      </p:nvGrpSpPr>
+      <p:grpSpPr>
+        <a:xfrm>
+          <a:off x="0" y="0"/>
+          <a:ext cx="0" cy="0"/>
+          <a:chOff x="0" y="0"/>
+          <a:chExt cx="0" cy="0"/>
+        </a:xfrm>
+      </p:grpSpPr>
+      <p:sp>
+        <p:nvSpPr>
+          <p:cNvPr id="14" name="Textfeld 13"/>
+          <p:cNvSpPr txBox="1"/>
+          <p:nvPr/>
+        </p:nvSpPr>
+        <p:spPr>
+          <a:xfrm>
+            <a:off x="1128889" y="485422"/>
+            <a:ext cx="4323644" cy="461665"/>
+          </a:xfrm>
+          <a:prstGeom prst="rect">
+            <a:avLst/>
+          </a:prstGeom>
+          <a:noFill/>
+        </p:spPr>
+        <p:txBody>
+          <a:bodyPr wrap="square" rtlCol="0">
+            <a:spAutoFit/>
+          </a:bodyPr>
+          <a:lstStyle/>
+          <a:p>
+            <a:r>
+              <a:rPr lang="en-US" sz="2400" b="1" dirty="0" smtClean="0"/>
+              <a:t>Quicksilver results</a:t>
+            </a:r>
+            <a:endParaRPr lang="en-US" sz="2400" b="1" dirty="0"/>
+          </a:p>
+        </p:txBody>
+      </p:sp>
+    </p:spTree>
+    <p:extLst>
+      <p:ext uri="{BB962C8B-B14F-4D97-AF65-F5344CB8AC3E}">
+        <p14:creationId xmlns:p14="http://schemas.microsoft.com/office/powerpoint/2010/main" val="4067684214"/>
+      </p:ext>
+    </p:extLst>
+  </p:cSld>
+  <p:clrMapOvr>
+    <a:masterClrMapping/>
+  </p:clrMapOvr>
+</p:sld>
+</file>
+
+<file path=ppt/slides/slide22.xml><?xml version="1.0" encoding="utf-8"?>
+<p:sld xmlns:a="http://schemas.openxmlformats.org/drawingml/2006/main" xmlns:r="http://schemas.openxmlformats.org/officeDocument/2006/relationships" xmlns:p="http://schemas.openxmlformats.org/presentationml/2006/main">
+  <p:cSld>
+    <p:spTree>
+      <p:nvGrpSpPr>
+        <p:cNvPr id="1" name=""/>
+        <p:cNvGrpSpPr/>
+        <p:nvPr/>
+      </p:nvGrpSpPr>
+      <p:grpSpPr>
+        <a:xfrm>
+          <a:off x="0" y="0"/>
+          <a:ext cx="0" cy="0"/>
+          <a:chOff x="0" y="0"/>
+          <a:chExt cx="0" cy="0"/>
+        </a:xfrm>
+      </p:grpSpPr>
+      <p:sp>
+        <p:nvSpPr>
+          <p:cNvPr id="14" name="Textfeld 13"/>
+          <p:cNvSpPr txBox="1"/>
+          <p:nvPr/>
+        </p:nvSpPr>
+        <p:spPr>
+          <a:xfrm>
+            <a:off x="1128889" y="485422"/>
+            <a:ext cx="4323644" cy="461665"/>
+          </a:xfrm>
+          <a:prstGeom prst="rect">
+            <a:avLst/>
+          </a:prstGeom>
+          <a:noFill/>
+        </p:spPr>
+        <p:txBody>
+          <a:bodyPr wrap="square" rtlCol="0">
+            <a:spAutoFit/>
+          </a:bodyPr>
+          <a:lstStyle/>
+          <a:p>
+            <a:r>
+              <a:rPr lang="en-US" sz="2400" b="1" dirty="0" smtClean="0"/>
               <a:t>Quicksilver results</a:t>
             </a:r>
             <a:endParaRPr lang="en-US" sz="2400" b="1" dirty="0"/>
@@ -3680,7 +4083,194 @@
 </p:sld>
 </file>
 
-<file path=ppt/slides/slide2.xml><?xml version="1.0" encoding="utf-8"?>
+<file path=ppt/slides/slide3.xml><?xml version="1.0" encoding="utf-8"?>
+<p:sld xmlns:a="http://schemas.openxmlformats.org/drawingml/2006/main" xmlns:r="http://schemas.openxmlformats.org/officeDocument/2006/relationships" xmlns:p="http://schemas.openxmlformats.org/presentationml/2006/main">
+  <p:cSld>
+    <p:spTree>
+      <p:nvGrpSpPr>
+        <p:cNvPr id="1" name=""/>
+        <p:cNvGrpSpPr/>
+        <p:nvPr/>
+      </p:nvGrpSpPr>
+      <p:grpSpPr>
+        <a:xfrm>
+          <a:off x="0" y="0"/>
+          <a:ext cx="0" cy="0"/>
+          <a:chOff x="0" y="0"/>
+          <a:chExt cx="0" cy="0"/>
+        </a:xfrm>
+      </p:grpSpPr>
+      <p:sp>
+        <p:nvSpPr>
+          <p:cNvPr id="2" name="Titel 1"/>
+          <p:cNvSpPr>
+            <a:spLocks noGrp="1"/>
+          </p:cNvSpPr>
+          <p:nvPr>
+            <p:ph type="title"/>
+          </p:nvPr>
+        </p:nvSpPr>
+        <p:spPr/>
+        <p:txBody>
+          <a:bodyPr/>
+          <a:lstStyle/>
+          <a:p>
+            <a:r>
+              <a:rPr lang="en-US" dirty="0" smtClean="0"/>
+              <a:t>Synthetic Evaluation</a:t>
+            </a:r>
+            <a:endParaRPr lang="en-US" dirty="0"/>
+          </a:p>
+        </p:txBody>
+      </p:sp>
+      <p:sp>
+        <p:nvSpPr>
+          <p:cNvPr id="3" name="Inhaltsplatzhalter 2"/>
+          <p:cNvSpPr>
+            <a:spLocks noGrp="1"/>
+          </p:cNvSpPr>
+          <p:nvPr>
+            <p:ph idx="1"/>
+          </p:nvPr>
+        </p:nvSpPr>
+        <p:spPr/>
+        <p:txBody>
+          <a:bodyPr/>
+          <a:lstStyle/>
+          <a:p>
+            <a:r>
+              <a:rPr lang="en-US" dirty="0" smtClean="0"/>
+              <a:t>Text</a:t>
+            </a:r>
+            <a:endParaRPr lang="en-US" dirty="0"/>
+          </a:p>
+        </p:txBody>
+      </p:sp>
+    </p:spTree>
+    <p:extLst>
+      <p:ext uri="{BB962C8B-B14F-4D97-AF65-F5344CB8AC3E}">
+        <p14:creationId xmlns:p14="http://schemas.microsoft.com/office/powerpoint/2010/main" val="2214273185"/>
+      </p:ext>
+    </p:extLst>
+  </p:cSld>
+  <p:clrMapOvr>
+    <a:masterClrMapping/>
+  </p:clrMapOvr>
+</p:sld>
+</file>
+
+<file path=ppt/slides/slide4.xml><?xml version="1.0" encoding="utf-8"?>
+<p:sld xmlns:a="http://schemas.openxmlformats.org/drawingml/2006/main" xmlns:r="http://schemas.openxmlformats.org/officeDocument/2006/relationships" xmlns:p="http://schemas.openxmlformats.org/presentationml/2006/main">
+  <p:cSld>
+    <p:spTree>
+      <p:nvGrpSpPr>
+        <p:cNvPr id="1" name=""/>
+        <p:cNvGrpSpPr/>
+        <p:nvPr/>
+      </p:nvGrpSpPr>
+      <p:grpSpPr>
+        <a:xfrm>
+          <a:off x="0" y="0"/>
+          <a:ext cx="0" cy="0"/>
+          <a:chOff x="0" y="0"/>
+          <a:chExt cx="0" cy="0"/>
+        </a:xfrm>
+      </p:grpSpPr>
+      <p:sp>
+        <p:nvSpPr>
+          <p:cNvPr id="2" name="Titel 1"/>
+          <p:cNvSpPr>
+            <a:spLocks noGrp="1"/>
+          </p:cNvSpPr>
+          <p:nvPr>
+            <p:ph type="title"/>
+          </p:nvPr>
+        </p:nvSpPr>
+        <p:spPr/>
+        <p:txBody>
+          <a:bodyPr/>
+          <a:lstStyle/>
+          <a:p>
+            <a:r>
+              <a:rPr lang="en-US" dirty="0" smtClean="0"/>
+              <a:t>Case Studies</a:t>
+            </a:r>
+            <a:endParaRPr lang="en-US" dirty="0"/>
+          </a:p>
+        </p:txBody>
+      </p:sp>
+      <p:sp>
+        <p:nvSpPr>
+          <p:cNvPr id="3" name="Inhaltsplatzhalter 2"/>
+          <p:cNvSpPr>
+            <a:spLocks noGrp="1"/>
+          </p:cNvSpPr>
+          <p:nvPr>
+            <p:ph idx="1"/>
+          </p:nvPr>
+        </p:nvSpPr>
+        <p:spPr/>
+        <p:txBody>
+          <a:bodyPr/>
+          <a:lstStyle/>
+          <a:p>
+            <a:r>
+              <a:rPr lang="en-US" dirty="0" smtClean="0"/>
+              <a:t>Relearn</a:t>
+            </a:r>
+          </a:p>
+          <a:p>
+            <a:r>
+              <a:rPr lang="en-US" dirty="0" err="1" smtClean="0"/>
+              <a:t>Lulesh</a:t>
+            </a:r>
+            <a:endParaRPr lang="en-US" dirty="0" smtClean="0"/>
+          </a:p>
+          <a:p>
+            <a:r>
+              <a:rPr lang="en-US" dirty="0" err="1" smtClean="0"/>
+              <a:t>MiniFE</a:t>
+            </a:r>
+            <a:endParaRPr lang="en-US" dirty="0" smtClean="0"/>
+          </a:p>
+          <a:p>
+            <a:r>
+              <a:rPr lang="en-US" dirty="0" smtClean="0"/>
+              <a:t>Kripke</a:t>
+            </a:r>
+          </a:p>
+          <a:p>
+            <a:r>
+              <a:rPr lang="en-US" dirty="0" smtClean="0"/>
+              <a:t>FASTEST</a:t>
+            </a:r>
+          </a:p>
+          <a:p>
+            <a:r>
+              <a:rPr lang="en-US" dirty="0" smtClean="0"/>
+              <a:t>Quicksilver</a:t>
+            </a:r>
+            <a:endParaRPr lang="en-US" dirty="0"/>
+          </a:p>
+          <a:p>
+            <a:endParaRPr lang="en-US" dirty="0"/>
+          </a:p>
+        </p:txBody>
+      </p:sp>
+    </p:spTree>
+    <p:extLst>
+      <p:ext uri="{BB962C8B-B14F-4D97-AF65-F5344CB8AC3E}">
+        <p14:creationId xmlns:p14="http://schemas.microsoft.com/office/powerpoint/2010/main" val="1278817527"/>
+      </p:ext>
+    </p:extLst>
+  </p:cSld>
+  <p:clrMapOvr>
+    <a:masterClrMapping/>
+  </p:clrMapOvr>
+</p:sld>
+</file>
+
+<file path=ppt/slides/slide5.xml><?xml version="1.0" encoding="utf-8"?>
 <p:sld xmlns:a="http://schemas.openxmlformats.org/drawingml/2006/main" xmlns:r="http://schemas.openxmlformats.org/officeDocument/2006/relationships" xmlns:p="http://schemas.openxmlformats.org/presentationml/2006/main">
   <p:cSld>
     <p:spTree>
@@ -4814,7 +5404,7 @@
 </p:sld>
 </file>
 
-<file path=ppt/slides/slide3.xml><?xml version="1.0" encoding="utf-8"?>
+<file path=ppt/slides/slide6.xml><?xml version="1.0" encoding="utf-8"?>
 <p:sld xmlns:a="http://schemas.openxmlformats.org/drawingml/2006/main" xmlns:r="http://schemas.openxmlformats.org/officeDocument/2006/relationships" xmlns:p="http://schemas.openxmlformats.org/presentationml/2006/main">
   <p:cSld>
     <p:spTree>
@@ -5002,7 +5592,7 @@
 </p:sld>
 </file>
 
-<file path=ppt/slides/slide4.xml><?xml version="1.0" encoding="utf-8"?>
+<file path=ppt/slides/slide7.xml><?xml version="1.0" encoding="utf-8"?>
 <p:sld xmlns:a="http://schemas.openxmlformats.org/drawingml/2006/main" xmlns:r="http://schemas.openxmlformats.org/officeDocument/2006/relationships" xmlns:p="http://schemas.openxmlformats.org/presentationml/2006/main">
   <p:cSld>
     <p:spTree>
@@ -5171,7 +5761,7 @@
 </p:sld>
 </file>
 
-<file path=ppt/slides/slide5.xml><?xml version="1.0" encoding="utf-8"?>
+<file path=ppt/slides/slide8.xml><?xml version="1.0" encoding="utf-8"?>
 <p:sld xmlns:a="http://schemas.openxmlformats.org/drawingml/2006/main" xmlns:r="http://schemas.openxmlformats.org/officeDocument/2006/relationships" xmlns:p="http://schemas.openxmlformats.org/presentationml/2006/main">
   <p:cSld>
     <p:spTree>
@@ -5342,430 +5932,6 @@
     <p:extLst>
       <p:ext uri="{BB962C8B-B14F-4D97-AF65-F5344CB8AC3E}">
         <p14:creationId xmlns:p14="http://schemas.microsoft.com/office/powerpoint/2010/main" val="1411974968"/>
-      </p:ext>
-    </p:extLst>
-  </p:cSld>
-  <p:clrMapOvr>
-    <a:masterClrMapping/>
-  </p:clrMapOvr>
-</p:sld>
-</file>
-
-<file path=ppt/slides/slide6.xml><?xml version="1.0" encoding="utf-8"?>
-<p:sld xmlns:a="http://schemas.openxmlformats.org/drawingml/2006/main" xmlns:r="http://schemas.openxmlformats.org/officeDocument/2006/relationships" xmlns:p="http://schemas.openxmlformats.org/presentationml/2006/main">
-  <p:cSld>
-    <p:spTree>
-      <p:nvGrpSpPr>
-        <p:cNvPr id="1" name=""/>
-        <p:cNvGrpSpPr/>
-        <p:nvPr/>
-      </p:nvGrpSpPr>
-      <p:grpSpPr>
-        <a:xfrm>
-          <a:off x="0" y="0"/>
-          <a:ext cx="0" cy="0"/>
-          <a:chOff x="0" y="0"/>
-          <a:chExt cx="0" cy="0"/>
-        </a:xfrm>
-      </p:grpSpPr>
-      <p:sp>
-        <p:nvSpPr>
-          <p:cNvPr id="14" name="Textfeld 13"/>
-          <p:cNvSpPr txBox="1"/>
-          <p:nvPr/>
-        </p:nvSpPr>
-        <p:spPr>
-          <a:xfrm>
-            <a:off x="1128889" y="485422"/>
-            <a:ext cx="4323644" cy="461665"/>
-          </a:xfrm>
-          <a:prstGeom prst="rect">
-            <a:avLst/>
-          </a:prstGeom>
-          <a:noFill/>
-        </p:spPr>
-        <p:txBody>
-          <a:bodyPr wrap="square" rtlCol="0">
-            <a:spAutoFit/>
-          </a:bodyPr>
-          <a:lstStyle/>
-          <a:p>
-            <a:r>
-              <a:rPr lang="en-US" sz="2400" b="1" dirty="0" smtClean="0"/>
-              <a:t>LULESH results - cost</a:t>
-            </a:r>
-            <a:endParaRPr lang="en-US" sz="2400" b="1" dirty="0"/>
-          </a:p>
-        </p:txBody>
-      </p:sp>
-      <p:pic>
-        <p:nvPicPr>
-          <p:cNvPr id="2" name="Grafik 1"/>
-          <p:cNvPicPr>
-            <a:picLocks noChangeAspect="1"/>
-          </p:cNvPicPr>
-          <p:nvPr/>
-        </p:nvPicPr>
-        <p:blipFill>
-          <a:blip r:embed="rId2">
-            <a:extLst>
-              <a:ext uri="{28A0092B-C50C-407E-A947-70E740481C1C}">
-                <a14:useLocalDpi xmlns:a14="http://schemas.microsoft.com/office/drawing/2010/main" val="0"/>
-              </a:ext>
-            </a:extLst>
-          </a:blip>
-          <a:stretch>
-            <a:fillRect/>
-          </a:stretch>
-        </p:blipFill>
-        <p:spPr>
-          <a:xfrm>
-            <a:off x="44009" y="0"/>
-            <a:ext cx="5852172" cy="4389129"/>
-          </a:xfrm>
-          <a:prstGeom prst="rect">
-            <a:avLst/>
-          </a:prstGeom>
-        </p:spPr>
-      </p:pic>
-      <p:pic>
-        <p:nvPicPr>
-          <p:cNvPr id="3" name="Grafik 2"/>
-          <p:cNvPicPr>
-            <a:picLocks noChangeAspect="1"/>
-          </p:cNvPicPr>
-          <p:nvPr/>
-        </p:nvPicPr>
-        <p:blipFill>
-          <a:blip r:embed="rId2">
-            <a:extLst>
-              <a:ext uri="{28A0092B-C50C-407E-A947-70E740481C1C}">
-                <a14:useLocalDpi xmlns:a14="http://schemas.microsoft.com/office/drawing/2010/main" val="0"/>
-              </a:ext>
-            </a:extLst>
-          </a:blip>
-          <a:stretch>
-            <a:fillRect/>
-          </a:stretch>
-        </p:blipFill>
-        <p:spPr>
-          <a:xfrm>
-            <a:off x="6173573" y="-216695"/>
-            <a:ext cx="5852172" cy="4389129"/>
-          </a:xfrm>
-          <a:prstGeom prst="rect">
-            <a:avLst/>
-          </a:prstGeom>
-        </p:spPr>
-      </p:pic>
-      <p:pic>
-        <p:nvPicPr>
-          <p:cNvPr id="4" name="Grafik 3"/>
-          <p:cNvPicPr>
-            <a:picLocks noChangeAspect="1"/>
-          </p:cNvPicPr>
-          <p:nvPr/>
-        </p:nvPicPr>
-        <p:blipFill>
-          <a:blip r:embed="rId2">
-            <a:extLst>
-              <a:ext uri="{28A0092B-C50C-407E-A947-70E740481C1C}">
-                <a14:useLocalDpi xmlns:a14="http://schemas.microsoft.com/office/drawing/2010/main" val="0"/>
-              </a:ext>
-            </a:extLst>
-          </a:blip>
-          <a:stretch>
-            <a:fillRect/>
-          </a:stretch>
-        </p:blipFill>
-        <p:spPr>
-          <a:xfrm>
-            <a:off x="493216" y="2679986"/>
-            <a:ext cx="5852172" cy="4389129"/>
-          </a:xfrm>
-          <a:prstGeom prst="rect">
-            <a:avLst/>
-          </a:prstGeom>
-        </p:spPr>
-      </p:pic>
-      <p:pic>
-        <p:nvPicPr>
-          <p:cNvPr id="5" name="Grafik 4"/>
-          <p:cNvPicPr>
-            <a:picLocks noChangeAspect="1"/>
-          </p:cNvPicPr>
-          <p:nvPr/>
-        </p:nvPicPr>
-        <p:blipFill>
-          <a:blip r:embed="rId2">
-            <a:extLst>
-              <a:ext uri="{28A0092B-C50C-407E-A947-70E740481C1C}">
-                <a14:useLocalDpi xmlns:a14="http://schemas.microsoft.com/office/drawing/2010/main" val="0"/>
-              </a:ext>
-            </a:extLst>
-          </a:blip>
-          <a:stretch>
-            <a:fillRect/>
-          </a:stretch>
-        </p:blipFill>
-        <p:spPr>
-          <a:xfrm>
-            <a:off x="5164969" y="3079006"/>
-            <a:ext cx="5852172" cy="4389129"/>
-          </a:xfrm>
-          <a:prstGeom prst="rect">
-            <a:avLst/>
-          </a:prstGeom>
-        </p:spPr>
-      </p:pic>
-    </p:spTree>
-    <p:extLst>
-      <p:ext uri="{BB962C8B-B14F-4D97-AF65-F5344CB8AC3E}">
-        <p14:creationId xmlns:p14="http://schemas.microsoft.com/office/powerpoint/2010/main" val="3148833393"/>
-      </p:ext>
-    </p:extLst>
-  </p:cSld>
-  <p:clrMapOvr>
-    <a:masterClrMapping/>
-  </p:clrMapOvr>
-</p:sld>
-</file>
-
-<file path=ppt/slides/slide7.xml><?xml version="1.0" encoding="utf-8"?>
-<p:sld xmlns:a="http://schemas.openxmlformats.org/drawingml/2006/main" xmlns:r="http://schemas.openxmlformats.org/officeDocument/2006/relationships" xmlns:p="http://schemas.openxmlformats.org/presentationml/2006/main">
-  <p:cSld>
-    <p:spTree>
-      <p:nvGrpSpPr>
-        <p:cNvPr id="1" name=""/>
-        <p:cNvGrpSpPr/>
-        <p:nvPr/>
-      </p:nvGrpSpPr>
-      <p:grpSpPr>
-        <a:xfrm>
-          <a:off x="0" y="0"/>
-          <a:ext cx="0" cy="0"/>
-          <a:chOff x="0" y="0"/>
-          <a:chExt cx="0" cy="0"/>
-        </a:xfrm>
-      </p:grpSpPr>
-      <p:sp>
-        <p:nvSpPr>
-          <p:cNvPr id="14" name="Textfeld 13"/>
-          <p:cNvSpPr txBox="1"/>
-          <p:nvPr/>
-        </p:nvSpPr>
-        <p:spPr>
-          <a:xfrm>
-            <a:off x="1128888" y="485422"/>
-            <a:ext cx="6784827" cy="461665"/>
-          </a:xfrm>
-          <a:prstGeom prst="rect">
-            <a:avLst/>
-          </a:prstGeom>
-          <a:noFill/>
-        </p:spPr>
-        <p:txBody>
-          <a:bodyPr wrap="square" rtlCol="0">
-            <a:spAutoFit/>
-          </a:bodyPr>
-          <a:lstStyle/>
-          <a:p>
-            <a:r>
-              <a:rPr lang="en-US" sz="2400" b="1" dirty="0" smtClean="0"/>
-              <a:t>LULESH results – additional points</a:t>
-            </a:r>
-            <a:endParaRPr lang="en-US" sz="2400" b="1" dirty="0"/>
-          </a:p>
-        </p:txBody>
-      </p:sp>
-      <p:pic>
-        <p:nvPicPr>
-          <p:cNvPr id="2" name="Grafik 1"/>
-          <p:cNvPicPr>
-            <a:picLocks noChangeAspect="1"/>
-          </p:cNvPicPr>
-          <p:nvPr/>
-        </p:nvPicPr>
-        <p:blipFill>
-          <a:blip r:embed="rId2">
-            <a:extLst>
-              <a:ext uri="{28A0092B-C50C-407E-A947-70E740481C1C}">
-                <a14:useLocalDpi xmlns:a14="http://schemas.microsoft.com/office/drawing/2010/main" val="0"/>
-              </a:ext>
-            </a:extLst>
-          </a:blip>
-          <a:stretch>
-            <a:fillRect/>
-          </a:stretch>
-        </p:blipFill>
-        <p:spPr>
-          <a:xfrm>
-            <a:off x="0" y="-477987"/>
-            <a:ext cx="5852172" cy="4389129"/>
-          </a:xfrm>
-          <a:prstGeom prst="rect">
-            <a:avLst/>
-          </a:prstGeom>
-        </p:spPr>
-      </p:pic>
-      <p:pic>
-        <p:nvPicPr>
-          <p:cNvPr id="3" name="Grafik 2"/>
-          <p:cNvPicPr>
-            <a:picLocks noChangeAspect="1"/>
-          </p:cNvPicPr>
-          <p:nvPr/>
-        </p:nvPicPr>
-        <p:blipFill>
-          <a:blip r:embed="rId2">
-            <a:extLst>
-              <a:ext uri="{28A0092B-C50C-407E-A947-70E740481C1C}">
-                <a14:useLocalDpi xmlns:a14="http://schemas.microsoft.com/office/drawing/2010/main" val="0"/>
-              </a:ext>
-            </a:extLst>
-          </a:blip>
-          <a:stretch>
-            <a:fillRect/>
-          </a:stretch>
-        </p:blipFill>
-        <p:spPr>
-          <a:xfrm>
-            <a:off x="5896507" y="-943499"/>
-            <a:ext cx="5852172" cy="4389129"/>
-          </a:xfrm>
-          <a:prstGeom prst="rect">
-            <a:avLst/>
-          </a:prstGeom>
-        </p:spPr>
-      </p:pic>
-      <p:pic>
-        <p:nvPicPr>
-          <p:cNvPr id="4" name="Grafik 3"/>
-          <p:cNvPicPr>
-            <a:picLocks noChangeAspect="1"/>
-          </p:cNvPicPr>
-          <p:nvPr/>
-        </p:nvPicPr>
-        <p:blipFill>
-          <a:blip r:embed="rId2">
-            <a:extLst>
-              <a:ext uri="{28A0092B-C50C-407E-A947-70E740481C1C}">
-                <a14:useLocalDpi xmlns:a14="http://schemas.microsoft.com/office/drawing/2010/main" val="0"/>
-              </a:ext>
-            </a:extLst>
-          </a:blip>
-          <a:stretch>
-            <a:fillRect/>
-          </a:stretch>
-        </p:blipFill>
-        <p:spPr>
-          <a:xfrm>
-            <a:off x="44335" y="3198605"/>
-            <a:ext cx="5852172" cy="4389129"/>
-          </a:xfrm>
-          <a:prstGeom prst="rect">
-            <a:avLst/>
-          </a:prstGeom>
-        </p:spPr>
-      </p:pic>
-      <p:pic>
-        <p:nvPicPr>
-          <p:cNvPr id="5" name="Grafik 4"/>
-          <p:cNvPicPr>
-            <a:picLocks noChangeAspect="1"/>
-          </p:cNvPicPr>
-          <p:nvPr/>
-        </p:nvPicPr>
-        <p:blipFill>
-          <a:blip r:embed="rId2">
-            <a:extLst>
-              <a:ext uri="{28A0092B-C50C-407E-A947-70E740481C1C}">
-                <a14:useLocalDpi xmlns:a14="http://schemas.microsoft.com/office/drawing/2010/main" val="0"/>
-              </a:ext>
-            </a:extLst>
-          </a:blip>
-          <a:stretch>
-            <a:fillRect/>
-          </a:stretch>
-        </p:blipFill>
-        <p:spPr>
-          <a:xfrm>
-            <a:off x="5447601" y="3198605"/>
-            <a:ext cx="5852172" cy="4389129"/>
-          </a:xfrm>
-          <a:prstGeom prst="rect">
-            <a:avLst/>
-          </a:prstGeom>
-        </p:spPr>
-      </p:pic>
-    </p:spTree>
-    <p:extLst>
-      <p:ext uri="{BB962C8B-B14F-4D97-AF65-F5344CB8AC3E}">
-        <p14:creationId xmlns:p14="http://schemas.microsoft.com/office/powerpoint/2010/main" val="813284526"/>
-      </p:ext>
-    </p:extLst>
-  </p:cSld>
-  <p:clrMapOvr>
-    <a:masterClrMapping/>
-  </p:clrMapOvr>
-</p:sld>
-</file>
-
-<file path=ppt/slides/slide8.xml><?xml version="1.0" encoding="utf-8"?>
-<p:sld xmlns:a="http://schemas.openxmlformats.org/drawingml/2006/main" xmlns:r="http://schemas.openxmlformats.org/officeDocument/2006/relationships" xmlns:p="http://schemas.openxmlformats.org/presentationml/2006/main">
-  <p:cSld>
-    <p:spTree>
-      <p:nvGrpSpPr>
-        <p:cNvPr id="1" name=""/>
-        <p:cNvGrpSpPr/>
-        <p:nvPr/>
-      </p:nvGrpSpPr>
-      <p:grpSpPr>
-        <a:xfrm>
-          <a:off x="0" y="0"/>
-          <a:ext cx="0" cy="0"/>
-          <a:chOff x="0" y="0"/>
-          <a:chExt cx="0" cy="0"/>
-        </a:xfrm>
-      </p:grpSpPr>
-      <p:sp>
-        <p:nvSpPr>
-          <p:cNvPr id="14" name="Textfeld 13"/>
-          <p:cNvSpPr txBox="1"/>
-          <p:nvPr/>
-        </p:nvSpPr>
-        <p:spPr>
-          <a:xfrm>
-            <a:off x="1128889" y="485422"/>
-            <a:ext cx="4323644" cy="461665"/>
-          </a:xfrm>
-          <a:prstGeom prst="rect">
-            <a:avLst/>
-          </a:prstGeom>
-          <a:noFill/>
-        </p:spPr>
-        <p:txBody>
-          <a:bodyPr wrap="square" rtlCol="0">
-            <a:spAutoFit/>
-          </a:bodyPr>
-          <a:lstStyle/>
-          <a:p>
-            <a:r>
-              <a:rPr lang="en-US" sz="2400" b="1" dirty="0" err="1" smtClean="0"/>
-              <a:t>MiniFE</a:t>
-            </a:r>
-            <a:r>
-              <a:rPr lang="en-US" sz="2400" b="1" dirty="0" smtClean="0"/>
-              <a:t> results</a:t>
-            </a:r>
-            <a:endParaRPr lang="en-US" sz="2400" b="1" dirty="0"/>
-          </a:p>
-        </p:txBody>
-      </p:sp>
-    </p:spTree>
-    <p:extLst>
-      <p:ext uri="{BB962C8B-B14F-4D97-AF65-F5344CB8AC3E}">
-        <p14:creationId xmlns:p14="http://schemas.microsoft.com/office/powerpoint/2010/main" val="3761832199"/>
       </p:ext>
     </p:extLst>
   </p:cSld>
@@ -5815,21 +5981,137 @@
           <a:lstStyle/>
           <a:p>
             <a:r>
-              <a:rPr lang="en-US" sz="2400" b="1" dirty="0" err="1" smtClean="0"/>
-              <a:t>MiniFE</a:t>
-            </a:r>
-            <a:r>
               <a:rPr lang="en-US" sz="2400" b="1" dirty="0" smtClean="0"/>
-              <a:t> results</a:t>
+              <a:t>LULESH results - cost</a:t>
             </a:r>
             <a:endParaRPr lang="en-US" sz="2400" b="1" dirty="0"/>
           </a:p>
         </p:txBody>
       </p:sp>
+      <p:pic>
+        <p:nvPicPr>
+          <p:cNvPr id="2" name="Grafik 1"/>
+          <p:cNvPicPr>
+            <a:picLocks noChangeAspect="1"/>
+          </p:cNvPicPr>
+          <p:nvPr/>
+        </p:nvPicPr>
+        <p:blipFill>
+          <a:blip r:embed="rId2">
+            <a:extLst>
+              <a:ext uri="{28A0092B-C50C-407E-A947-70E740481C1C}">
+                <a14:useLocalDpi xmlns:a14="http://schemas.microsoft.com/office/drawing/2010/main" val="0"/>
+              </a:ext>
+            </a:extLst>
+          </a:blip>
+          <a:stretch>
+            <a:fillRect/>
+          </a:stretch>
+        </p:blipFill>
+        <p:spPr>
+          <a:xfrm>
+            <a:off x="44009" y="0"/>
+            <a:ext cx="5852172" cy="4389129"/>
+          </a:xfrm>
+          <a:prstGeom prst="rect">
+            <a:avLst/>
+          </a:prstGeom>
+        </p:spPr>
+      </p:pic>
+      <p:pic>
+        <p:nvPicPr>
+          <p:cNvPr id="3" name="Grafik 2"/>
+          <p:cNvPicPr>
+            <a:picLocks noChangeAspect="1"/>
+          </p:cNvPicPr>
+          <p:nvPr/>
+        </p:nvPicPr>
+        <p:blipFill>
+          <a:blip r:embed="rId2">
+            <a:extLst>
+              <a:ext uri="{28A0092B-C50C-407E-A947-70E740481C1C}">
+                <a14:useLocalDpi xmlns:a14="http://schemas.microsoft.com/office/drawing/2010/main" val="0"/>
+              </a:ext>
+            </a:extLst>
+          </a:blip>
+          <a:stretch>
+            <a:fillRect/>
+          </a:stretch>
+        </p:blipFill>
+        <p:spPr>
+          <a:xfrm>
+            <a:off x="6173573" y="-216695"/>
+            <a:ext cx="5852172" cy="4389129"/>
+          </a:xfrm>
+          <a:prstGeom prst="rect">
+            <a:avLst/>
+          </a:prstGeom>
+        </p:spPr>
+      </p:pic>
+      <p:pic>
+        <p:nvPicPr>
+          <p:cNvPr id="4" name="Grafik 3"/>
+          <p:cNvPicPr>
+            <a:picLocks noChangeAspect="1"/>
+          </p:cNvPicPr>
+          <p:nvPr/>
+        </p:nvPicPr>
+        <p:blipFill>
+          <a:blip r:embed="rId2">
+            <a:extLst>
+              <a:ext uri="{28A0092B-C50C-407E-A947-70E740481C1C}">
+                <a14:useLocalDpi xmlns:a14="http://schemas.microsoft.com/office/drawing/2010/main" val="0"/>
+              </a:ext>
+            </a:extLst>
+          </a:blip>
+          <a:stretch>
+            <a:fillRect/>
+          </a:stretch>
+        </p:blipFill>
+        <p:spPr>
+          <a:xfrm>
+            <a:off x="493216" y="2679986"/>
+            <a:ext cx="5852172" cy="4389129"/>
+          </a:xfrm>
+          <a:prstGeom prst="rect">
+            <a:avLst/>
+          </a:prstGeom>
+        </p:spPr>
+      </p:pic>
+      <p:pic>
+        <p:nvPicPr>
+          <p:cNvPr id="5" name="Grafik 4"/>
+          <p:cNvPicPr>
+            <a:picLocks noChangeAspect="1"/>
+          </p:cNvPicPr>
+          <p:nvPr/>
+        </p:nvPicPr>
+        <p:blipFill>
+          <a:blip r:embed="rId2">
+            <a:extLst>
+              <a:ext uri="{28A0092B-C50C-407E-A947-70E740481C1C}">
+                <a14:useLocalDpi xmlns:a14="http://schemas.microsoft.com/office/drawing/2010/main" val="0"/>
+              </a:ext>
+            </a:extLst>
+          </a:blip>
+          <a:stretch>
+            <a:fillRect/>
+          </a:stretch>
+        </p:blipFill>
+        <p:spPr>
+          <a:xfrm>
+            <a:off x="5164969" y="3079006"/>
+            <a:ext cx="5852172" cy="4389129"/>
+          </a:xfrm>
+          <a:prstGeom prst="rect">
+            <a:avLst/>
+          </a:prstGeom>
+        </p:spPr>
+      </p:pic>
     </p:spTree>
     <p:extLst>
       <p:ext uri="{BB962C8B-B14F-4D97-AF65-F5344CB8AC3E}">
-        <p14:creationId xmlns:p14="http://schemas.microsoft.com/office/powerpoint/2010/main" val="4115146552"/>
+        <p14:creationId xmlns:p14="http://schemas.microsoft.com/office/powerpoint/2010/main" val="3148833393"/>
       </p:ext>
     </p:extLst>
   </p:cSld>

</xml_diff>